<commit_message>
TOREVIEW-> endpoint creados en faker se parametriza rebajas, se quita oto-invierno
</commit_message>
<xml_diff>
--- a/docs/oto-invierno.pptx
+++ b/docs/oto-invierno.pptx
@@ -197,7 +197,7 @@
           <a:p>
             <a:fld id="{28C7DD2D-EC57-A84E-B3EE-16F932E51D89}" type="datetimeFigureOut">
               <a:rPr lang="es-MX" smtClean="0"/>
-              <a:t>14/09/20</a:t>
+              <a:t>15/09/20</a:t>
             </a:fld>
             <a:endParaRPr lang="es-MX"/>
           </a:p>
@@ -698,7 +698,7 @@
           <a:p>
             <a:fld id="{68BF357F-16BC-764D-A1B0-E74A75D8A5FF}" type="datetimeFigureOut">
               <a:rPr lang="es-MX" smtClean="0"/>
-              <a:t>14/09/20</a:t>
+              <a:t>15/09/20</a:t>
             </a:fld>
             <a:endParaRPr lang="es-MX"/>
           </a:p>
@@ -898,7 +898,7 @@
           <a:p>
             <a:fld id="{68BF357F-16BC-764D-A1B0-E74A75D8A5FF}" type="datetimeFigureOut">
               <a:rPr lang="es-MX" smtClean="0"/>
-              <a:t>14/09/20</a:t>
+              <a:t>15/09/20</a:t>
             </a:fld>
             <a:endParaRPr lang="es-MX"/>
           </a:p>
@@ -1108,7 +1108,7 @@
           <a:p>
             <a:fld id="{68BF357F-16BC-764D-A1B0-E74A75D8A5FF}" type="datetimeFigureOut">
               <a:rPr lang="es-MX" smtClean="0"/>
-              <a:t>14/09/20</a:t>
+              <a:t>15/09/20</a:t>
             </a:fld>
             <a:endParaRPr lang="es-MX"/>
           </a:p>
@@ -1308,7 +1308,7 @@
           <a:p>
             <a:fld id="{68BF357F-16BC-764D-A1B0-E74A75D8A5FF}" type="datetimeFigureOut">
               <a:rPr lang="es-MX" smtClean="0"/>
-              <a:t>14/09/20</a:t>
+              <a:t>15/09/20</a:t>
             </a:fld>
             <a:endParaRPr lang="es-MX"/>
           </a:p>
@@ -1584,7 +1584,7 @@
           <a:p>
             <a:fld id="{68BF357F-16BC-764D-A1B0-E74A75D8A5FF}" type="datetimeFigureOut">
               <a:rPr lang="es-MX" smtClean="0"/>
-              <a:t>14/09/20</a:t>
+              <a:t>15/09/20</a:t>
             </a:fld>
             <a:endParaRPr lang="es-MX"/>
           </a:p>
@@ -1852,7 +1852,7 @@
           <a:p>
             <a:fld id="{68BF357F-16BC-764D-A1B0-E74A75D8A5FF}" type="datetimeFigureOut">
               <a:rPr lang="es-MX" smtClean="0"/>
-              <a:t>14/09/20</a:t>
+              <a:t>15/09/20</a:t>
             </a:fld>
             <a:endParaRPr lang="es-MX"/>
           </a:p>
@@ -2267,7 +2267,7 @@
           <a:p>
             <a:fld id="{68BF357F-16BC-764D-A1B0-E74A75D8A5FF}" type="datetimeFigureOut">
               <a:rPr lang="es-MX" smtClean="0"/>
-              <a:t>14/09/20</a:t>
+              <a:t>15/09/20</a:t>
             </a:fld>
             <a:endParaRPr lang="es-MX"/>
           </a:p>
@@ -2409,7 +2409,7 @@
           <a:p>
             <a:fld id="{68BF357F-16BC-764D-A1B0-E74A75D8A5FF}" type="datetimeFigureOut">
               <a:rPr lang="es-MX" smtClean="0"/>
-              <a:t>14/09/20</a:t>
+              <a:t>15/09/20</a:t>
             </a:fld>
             <a:endParaRPr lang="es-MX"/>
           </a:p>
@@ -2522,7 +2522,7 @@
           <a:p>
             <a:fld id="{68BF357F-16BC-764D-A1B0-E74A75D8A5FF}" type="datetimeFigureOut">
               <a:rPr lang="es-MX" smtClean="0"/>
-              <a:t>14/09/20</a:t>
+              <a:t>15/09/20</a:t>
             </a:fld>
             <a:endParaRPr lang="es-MX"/>
           </a:p>
@@ -2835,7 +2835,7 @@
           <a:p>
             <a:fld id="{68BF357F-16BC-764D-A1B0-E74A75D8A5FF}" type="datetimeFigureOut">
               <a:rPr lang="es-MX" smtClean="0"/>
-              <a:t>14/09/20</a:t>
+              <a:t>15/09/20</a:t>
             </a:fld>
             <a:endParaRPr lang="es-MX"/>
           </a:p>
@@ -3124,7 +3124,7 @@
           <a:p>
             <a:fld id="{68BF357F-16BC-764D-A1B0-E74A75D8A5FF}" type="datetimeFigureOut">
               <a:rPr lang="es-MX" smtClean="0"/>
-              <a:t>14/09/20</a:t>
+              <a:t>15/09/20</a:t>
             </a:fld>
             <a:endParaRPr lang="es-MX"/>
           </a:p>
@@ -3367,7 +3367,7 @@
           <a:p>
             <a:fld id="{68BF357F-16BC-764D-A1B0-E74A75D8A5FF}" type="datetimeFigureOut">
               <a:rPr lang="es-MX" smtClean="0"/>
-              <a:t>14/09/20</a:t>
+              <a:t>15/09/20</a:t>
             </a:fld>
             <a:endParaRPr lang="es-MX"/>
           </a:p>
@@ -4186,6 +4186,45 @@
             <a:r>
               <a:rPr lang="es-MX" sz="1000" dirty="0"/>
               <a:t>oto-invierno</a:t>
+            </a:r>
+          </a:p>
+        </p:txBody>
+      </p:sp>
+      <p:sp>
+        <p:nvSpPr>
+          <p:cNvPr id="12" name="CuadroTexto 11">
+            <a:extLst>
+              <a:ext uri="{FF2B5EF4-FFF2-40B4-BE49-F238E27FC236}">
+                <a16:creationId xmlns:a16="http://schemas.microsoft.com/office/drawing/2014/main" id="{D02FE13F-3197-A64E-A518-7A82C6AA0E5B}"/>
+              </a:ext>
+            </a:extLst>
+          </p:cNvPr>
+          <p:cNvSpPr txBox="1"/>
+          <p:nvPr/>
+        </p:nvSpPr>
+        <p:spPr>
+          <a:xfrm>
+            <a:off x="5962878" y="2421729"/>
+            <a:ext cx="5225097" cy="1754326"/>
+          </a:xfrm>
+          <a:prstGeom prst="rect">
+            <a:avLst/>
+          </a:prstGeom>
+          <a:noFill/>
+        </p:spPr>
+        <p:txBody>
+          <a:bodyPr vert="horz" wrap="square" rtlCol="0" anchor="ctr" anchorCtr="0">
+            <a:spAutoFit/>
+          </a:bodyPr>
+          <a:lstStyle/>
+          <a:p>
+            <a:r>
+              <a:rPr lang="es-MX" sz="3600" dirty="0">
+                <a:solidFill>
+                  <a:srgbClr val="FF0000"/>
+                </a:solidFill>
+              </a:rPr>
+              <a:t>ELIMINADO!!!!  QUEDA PARAMETRIZADO EN EL DE REBAJAS</a:t>
             </a:r>
           </a:p>
         </p:txBody>

</xml_diff>